<commit_message>
update to viz and slides
</commit_message>
<xml_diff>
--- a/slides/WebAppDevelopmentWithJavaScript.pptx
+++ b/slides/WebAppDevelopmentWithJavaScript.pptx
@@ -10375,11 +10375,43 @@
               <a:buNone/>
             </a:pPr>
             <a:r>
+              <a:rPr lang="pt-BR" sz="1500" dirty="0">
+                <a:latin typeface="Courier New"/>
+                <a:cs typeface="Courier New"/>
+                <a:hlinkClick r:id="rId3"/>
+              </a:rPr>
+              <a:t>http://localhost:9763/wso2coffeeshop/views/</a:t>
+            </a:r>
+            <a:r>
+              <a:rPr lang="pt-BR" sz="1500" dirty="0" smtClean="0">
+                <a:latin typeface="Courier New"/>
+                <a:cs typeface="Courier New"/>
+                <a:hlinkClick r:id="rId3"/>
+              </a:rPr>
+              <a:t>salesByCategory.html</a:t>
+            </a:r>
+            <a:endParaRPr lang="pt-BR" sz="1500" dirty="0" smtClean="0">
+              <a:latin typeface="Courier New"/>
+              <a:cs typeface="Courier New"/>
+            </a:endParaRPr>
+          </a:p>
+          <a:p>
+            <a:pPr marL="0" indent="0">
+              <a:buNone/>
+            </a:pPr>
+            <a:r>
+              <a:rPr lang="nb-NO" sz="1500" dirty="0" smtClean="0">
+                <a:latin typeface="Courier New"/>
+                <a:cs typeface="Courier New"/>
+              </a:rPr>
+              <a:t>&lt;</a:t>
+            </a:r>
+            <a:r>
               <a:rPr lang="nb-NO" sz="1500" dirty="0">
                 <a:latin typeface="Courier New"/>
                 <a:cs typeface="Courier New"/>
               </a:rPr>
-              <a:t>&lt;div&gt;</a:t>
+              <a:t>div&gt;</a:t>
             </a:r>
           </a:p>
           <a:p>
@@ -10427,11 +10459,18 @@
               <a:buNone/>
             </a:pPr>
             <a:r>
+              <a:rPr lang="nb-NO" sz="1500" dirty="0" smtClean="0">
+                <a:latin typeface="Courier New"/>
+                <a:cs typeface="Courier New"/>
+              </a:rPr>
+              <a:t>&lt;</a:t>
+            </a:r>
+            <a:r>
               <a:rPr lang="nb-NO" sz="1500" dirty="0">
                 <a:latin typeface="Courier New"/>
                 <a:cs typeface="Courier New"/>
               </a:rPr>
-              <a:t>  &lt;/div</a:t>
+              <a:t>/div</a:t>
             </a:r>
             <a:r>
               <a:rPr lang="nb-NO" sz="1500" dirty="0" smtClean="0">
@@ -10794,8 +10833,24 @@
                 <a:latin typeface="Courier New"/>
                 <a:cs typeface="Courier New"/>
               </a:rPr>
-              <a:t>    .call(chart);</a:t>
-            </a:r>
+              <a:t>    .call(chart)</a:t>
+            </a:r>
+            <a:r>
+              <a:rPr lang="en-US" sz="1500" dirty="0" smtClean="0">
+                <a:latin typeface="Courier New"/>
+                <a:cs typeface="Courier New"/>
+              </a:rPr>
+              <a:t>;</a:t>
+            </a:r>
+          </a:p>
+          <a:p>
+            <a:pPr marL="0" indent="0">
+              <a:buNone/>
+            </a:pPr>
+            <a:endParaRPr lang="en-US" sz="1500" dirty="0">
+              <a:latin typeface="Courier New"/>
+              <a:cs typeface="Courier New"/>
+            </a:endParaRPr>
           </a:p>
           <a:p>
             <a:pPr marL="0" indent="0">
@@ -10905,11 +10960,52 @@
               <a:buNone/>
             </a:pPr>
             <a:r>
+              <a:rPr lang="pt-BR" sz="1500" dirty="0">
+                <a:latin typeface="Courier New"/>
+                <a:cs typeface="Courier New"/>
+                <a:hlinkClick r:id="rId3"/>
+              </a:rPr>
+              <a:t>http://localhost:9763/wso2coffeeshop/views/</a:t>
+            </a:r>
+            <a:r>
+              <a:rPr lang="pt-BR" sz="1500" dirty="0" smtClean="0">
+                <a:latin typeface="Courier New"/>
+                <a:cs typeface="Courier New"/>
+                <a:hlinkClick r:id="rId3"/>
+              </a:rPr>
+              <a:t>salesRealTime.html</a:t>
+            </a:r>
+            <a:endParaRPr lang="pt-BR" sz="1500" dirty="0" smtClean="0">
+              <a:latin typeface="Courier New"/>
+              <a:cs typeface="Courier New"/>
+            </a:endParaRPr>
+          </a:p>
+          <a:p>
+            <a:pPr marL="0" indent="0">
+              <a:buNone/>
+            </a:pPr>
+            <a:endParaRPr lang="en-US" sz="1500" dirty="0" smtClean="0">
+              <a:latin typeface="Courier New"/>
+              <a:cs typeface="Courier New"/>
+            </a:endParaRPr>
+          </a:p>
+          <a:p>
+            <a:pPr marL="0" indent="0">
+              <a:buNone/>
+            </a:pPr>
+            <a:r>
+              <a:rPr lang="en-US" sz="1500" dirty="0" smtClean="0">
+                <a:latin typeface="Courier New"/>
+                <a:cs typeface="Courier New"/>
+              </a:rPr>
+              <a:t>&lt;</a:t>
+            </a:r>
+            <a:r>
               <a:rPr lang="en-US" sz="1500" dirty="0">
                 <a:latin typeface="Courier New"/>
                 <a:cs typeface="Courier New"/>
               </a:rPr>
-              <a:t>&lt;canvas id="tree" width="500" height="500"&gt;</a:t>
+              <a:t>canvas id="tree" width="500" height="500"&gt;</a:t>
             </a:r>
           </a:p>
           <a:p>

</xml_diff>